<commit_message>
sending to IOT Hub
send to IOT Hub
</commit_message>
<xml_diff>
--- a/doc/diagrams/diagrams.pptx
+++ b/doc/diagrams/diagrams.pptx
@@ -3112,23 +3112,31 @@
             </a:br>
             <a:r>
               <a:rPr lang="fr-FR" dirty="0"/>
-              <a:t>(Table </a:t>
+              <a:t>(DocumentDB, HDInsight </a:t>
+            </a:r>
+            <a:r>
+              <a:rPr lang="fr-FR" dirty="0" err="1"/>
+              <a:t>Hbase</a:t>
+            </a:r>
+            <a:r>
+              <a:rPr lang="fr-FR" dirty="0"/>
+              <a:t>, </a:t>
+            </a:r>
+            <a:r>
+              <a:rPr lang="fr-FR" dirty="0"/>
+              <a:t>Table </a:t>
             </a:r>
             <a:r>
               <a:rPr lang="fr-FR" dirty="0" err="1"/>
               <a:t>storage</a:t>
             </a:r>
             <a:r>
-              <a:rPr lang="fr-FR" dirty="0"/>
-              <a:t>, DocumentDB, HDInsight </a:t>
-            </a:r>
-            <a:r>
-              <a:rPr lang="fr-FR" dirty="0" err="1"/>
-              <a:t>Hbase</a:t>
-            </a:r>
-            <a:r>
               <a:rPr lang="fr-FR"/>
-              <a:t>, …)</a:t>
+              <a:t>, </a:t>
+            </a:r>
+            <a:r>
+              <a:rPr lang="fr-FR"/>
+              <a:t>…)</a:t>
             </a:r>
             <a:endParaRPr lang="fr-FR" dirty="0"/>
           </a:p>

</xml_diff>